<commit_message>
Removed 'MF' from UDP header and packet payload fields
</commit_message>
<xml_diff>
--- a/Lab2Visualization.pptx
+++ b/Lab2Visualization.pptx
@@ -292,7 +292,7 @@
           <a:p>
             <a:fld id="{35213E75-D8E7-9F4D-8D81-FCD94379C9FB}" type="datetimeFigureOut">
               <a:rPr lang="en-US" smtClean="0"/>
-              <a:t>12/2/13</a:t>
+              <a:t>12/3/13</a:t>
             </a:fld>
             <a:endParaRPr lang="en-US"/>
           </a:p>
@@ -462,7 +462,7 @@
           <a:p>
             <a:fld id="{35213E75-D8E7-9F4D-8D81-FCD94379C9FB}" type="datetimeFigureOut">
               <a:rPr lang="en-US" smtClean="0"/>
-              <a:t>12/2/13</a:t>
+              <a:t>12/3/13</a:t>
             </a:fld>
             <a:endParaRPr lang="en-US"/>
           </a:p>
@@ -642,7 +642,7 @@
           <a:p>
             <a:fld id="{35213E75-D8E7-9F4D-8D81-FCD94379C9FB}" type="datetimeFigureOut">
               <a:rPr lang="en-US" smtClean="0"/>
-              <a:t>12/2/13</a:t>
+              <a:t>12/3/13</a:t>
             </a:fld>
             <a:endParaRPr lang="en-US"/>
           </a:p>
@@ -812,7 +812,7 @@
           <a:p>
             <a:fld id="{35213E75-D8E7-9F4D-8D81-FCD94379C9FB}" type="datetimeFigureOut">
               <a:rPr lang="en-US" smtClean="0"/>
-              <a:t>12/2/13</a:t>
+              <a:t>12/3/13</a:t>
             </a:fld>
             <a:endParaRPr lang="en-US"/>
           </a:p>
@@ -1058,7 +1058,7 @@
           <a:p>
             <a:fld id="{35213E75-D8E7-9F4D-8D81-FCD94379C9FB}" type="datetimeFigureOut">
               <a:rPr lang="en-US" smtClean="0"/>
-              <a:t>12/2/13</a:t>
+              <a:t>12/3/13</a:t>
             </a:fld>
             <a:endParaRPr lang="en-US"/>
           </a:p>
@@ -1346,7 +1346,7 @@
           <a:p>
             <a:fld id="{35213E75-D8E7-9F4D-8D81-FCD94379C9FB}" type="datetimeFigureOut">
               <a:rPr lang="en-US" smtClean="0"/>
-              <a:t>12/2/13</a:t>
+              <a:t>12/3/13</a:t>
             </a:fld>
             <a:endParaRPr lang="en-US"/>
           </a:p>
@@ -1768,7 +1768,7 @@
           <a:p>
             <a:fld id="{35213E75-D8E7-9F4D-8D81-FCD94379C9FB}" type="datetimeFigureOut">
               <a:rPr lang="en-US" smtClean="0"/>
-              <a:t>12/2/13</a:t>
+              <a:t>12/3/13</a:t>
             </a:fld>
             <a:endParaRPr lang="en-US"/>
           </a:p>
@@ -1886,7 +1886,7 @@
           <a:p>
             <a:fld id="{35213E75-D8E7-9F4D-8D81-FCD94379C9FB}" type="datetimeFigureOut">
               <a:rPr lang="en-US" smtClean="0"/>
-              <a:t>12/2/13</a:t>
+              <a:t>12/3/13</a:t>
             </a:fld>
             <a:endParaRPr lang="en-US"/>
           </a:p>
@@ -1981,7 +1981,7 @@
           <a:p>
             <a:fld id="{35213E75-D8E7-9F4D-8D81-FCD94379C9FB}" type="datetimeFigureOut">
               <a:rPr lang="en-US" smtClean="0"/>
-              <a:t>12/2/13</a:t>
+              <a:t>12/3/13</a:t>
             </a:fld>
             <a:endParaRPr lang="en-US"/>
           </a:p>
@@ -2258,7 +2258,7 @@
           <a:p>
             <a:fld id="{35213E75-D8E7-9F4D-8D81-FCD94379C9FB}" type="datetimeFigureOut">
               <a:rPr lang="en-US" smtClean="0"/>
-              <a:t>12/2/13</a:t>
+              <a:t>12/3/13</a:t>
             </a:fld>
             <a:endParaRPr lang="en-US"/>
           </a:p>
@@ -2511,7 +2511,7 @@
           <a:p>
             <a:fld id="{35213E75-D8E7-9F4D-8D81-FCD94379C9FB}" type="datetimeFigureOut">
               <a:rPr lang="en-US" smtClean="0"/>
-              <a:t>12/2/13</a:t>
+              <a:t>12/3/13</a:t>
             </a:fld>
             <a:endParaRPr lang="en-US"/>
           </a:p>
@@ -2724,7 +2724,7 @@
           <a:p>
             <a:fld id="{35213E75-D8E7-9F4D-8D81-FCD94379C9FB}" type="datetimeFigureOut">
               <a:rPr lang="en-US" smtClean="0"/>
-              <a:t>12/2/13</a:t>
+              <a:t>12/3/13</a:t>
             </a:fld>
             <a:endParaRPr lang="en-US"/>
           </a:p>
@@ -3264,7 +3264,11 @@
             <a:pPr algn="ctr"/>
             <a:r>
               <a:rPr lang="en-US" sz="2000" dirty="0" smtClean="0"/>
-              <a:t>UDP Header ‘MF’</a:t>
+              <a:t>UDP </a:t>
+            </a:r>
+            <a:r>
+              <a:rPr lang="en-US" sz="2000" dirty="0" smtClean="0"/>
+              <a:t>Header</a:t>
             </a:r>
             <a:endParaRPr lang="en-US" sz="2000" dirty="0"/>
           </a:p>
@@ -3404,7 +3408,11 @@
             <a:pPr algn="ctr"/>
             <a:r>
               <a:rPr lang="en-US" sz="2000" dirty="0" smtClean="0"/>
-              <a:t>“Falun gong” ‘MF’</a:t>
+              <a:t>“Falun gong</a:t>
+            </a:r>
+            <a:r>
+              <a:rPr lang="en-US" sz="2000" dirty="0" smtClean="0"/>
+              <a:t>”</a:t>
             </a:r>
             <a:endParaRPr lang="en-US" sz="2000" dirty="0"/>
           </a:p>
@@ -3544,7 +3552,11 @@
             <a:pPr algn="ctr"/>
             <a:r>
               <a:rPr lang="en-US" sz="2000" dirty="0" smtClean="0"/>
-              <a:t>“Nothing to see here” ‘MF’</a:t>
+              <a:t>“Nothing to see here</a:t>
+            </a:r>
+            <a:r>
+              <a:rPr lang="en-US" sz="2000" dirty="0" smtClean="0"/>
+              <a:t>”</a:t>
             </a:r>
             <a:endParaRPr lang="en-US" sz="2000" dirty="0"/>
           </a:p>
@@ -3897,11 +3909,7 @@
             <a:pPr algn="ctr"/>
             <a:r>
               <a:rPr lang="en-US" sz="3200" b="1" dirty="0" smtClean="0"/>
-              <a:t>Router with IDS (</a:t>
-            </a:r>
-            <a:r>
-              <a:rPr lang="en-US" sz="3200" b="1" dirty="0" smtClean="0"/>
-              <a:t>Ubuntu)</a:t>
+              <a:t>Router with IDS (Ubuntu)</a:t>
             </a:r>
             <a:endParaRPr lang="en-US" sz="3200" b="1" dirty="0"/>
           </a:p>
@@ -4041,7 +4049,11 @@
             <a:pPr algn="ctr"/>
             <a:r>
               <a:rPr lang="en-US" sz="2000" dirty="0" smtClean="0"/>
-              <a:t>UDP Header ‘MF’</a:t>
+              <a:t>UDP </a:t>
+            </a:r>
+            <a:r>
+              <a:rPr lang="en-US" sz="2000" dirty="0" smtClean="0"/>
+              <a:t>Header</a:t>
             </a:r>
             <a:endParaRPr lang="en-US" sz="2000" dirty="0"/>
           </a:p>
@@ -4181,7 +4193,11 @@
             <a:pPr algn="ctr"/>
             <a:r>
               <a:rPr lang="en-US" sz="2000" dirty="0" smtClean="0"/>
-              <a:t>“Falun gong” ‘MF’</a:t>
+              <a:t>“Falun gong</a:t>
+            </a:r>
+            <a:r>
+              <a:rPr lang="en-US" sz="2000" dirty="0" smtClean="0"/>
+              <a:t>”</a:t>
             </a:r>
             <a:endParaRPr lang="en-US" sz="2000" dirty="0"/>
           </a:p>
@@ -4321,7 +4337,7 @@
             <a:pPr algn="ctr"/>
             <a:r>
               <a:rPr lang="en-US" sz="2000" dirty="0" smtClean="0"/>
-              <a:t>“Nothing to see here” ‘MF’</a:t>
+              <a:t>“Nothing to see here” </a:t>
             </a:r>
             <a:endParaRPr lang="en-US" sz="2000" dirty="0"/>
           </a:p>
@@ -5267,7 +5283,11 @@
             <a:pPr algn="ctr"/>
             <a:r>
               <a:rPr lang="en-US" sz="2000" dirty="0" smtClean="0"/>
-              <a:t>UDP Header ‘MF’</a:t>
+              <a:t>UDP </a:t>
+            </a:r>
+            <a:r>
+              <a:rPr lang="en-US" sz="2000" dirty="0" smtClean="0"/>
+              <a:t>Header</a:t>
             </a:r>
             <a:endParaRPr lang="en-US" sz="2000" dirty="0"/>
           </a:p>
@@ -5407,7 +5427,11 @@
             <a:pPr algn="ctr"/>
             <a:r>
               <a:rPr lang="en-US" sz="2000" dirty="0" smtClean="0"/>
-              <a:t>“Falun gong” ‘MF’</a:t>
+              <a:t>“Falun gong</a:t>
+            </a:r>
+            <a:r>
+              <a:rPr lang="en-US" sz="2000" dirty="0" smtClean="0"/>
+              <a:t>”</a:t>
             </a:r>
             <a:endParaRPr lang="en-US" sz="2000" dirty="0"/>
           </a:p>
@@ -5547,7 +5571,11 @@
             <a:pPr algn="ctr"/>
             <a:r>
               <a:rPr lang="en-US" sz="2000" dirty="0" smtClean="0"/>
-              <a:t>“Nothing to see here” ‘MF’</a:t>
+              <a:t>“Nothing to see here</a:t>
+            </a:r>
+            <a:r>
+              <a:rPr lang="en-US" sz="2000" dirty="0" smtClean="0"/>
+              <a:t>”</a:t>
             </a:r>
             <a:endParaRPr lang="en-US" sz="2000" dirty="0"/>
           </a:p>

</xml_diff>